<commit_message>
ppt apresentação parte Ca.
</commit_message>
<xml_diff>
--- a/Documentação/Apresentação Projeto PID.pptx
+++ b/Documentação/Apresentação Projeto PID.pptx
@@ -12,11 +12,12 @@
     <p:sldId id="263" r:id="rId6"/>
     <p:sldId id="265" r:id="rId7"/>
     <p:sldId id="266" r:id="rId8"/>
-    <p:sldId id="259" r:id="rId9"/>
-    <p:sldId id="260" r:id="rId10"/>
-    <p:sldId id="258" r:id="rId11"/>
-    <p:sldId id="261" r:id="rId12"/>
-    <p:sldId id="267" r:id="rId13"/>
+    <p:sldId id="260" r:id="rId9"/>
+    <p:sldId id="268" r:id="rId10"/>
+    <p:sldId id="259" r:id="rId11"/>
+    <p:sldId id="258" r:id="rId12"/>
+    <p:sldId id="261" r:id="rId13"/>
+    <p:sldId id="267" r:id="rId14"/>
   </p:sldIdLst>
   <p:sldSz cx="12192000" cy="6858000"/>
   <p:notesSz cx="6858000" cy="9144000"/>
@@ -4565,7 +4566,7 @@
         <p:spPr>
           <a:xfrm>
             <a:off x="609600" y="274638"/>
-            <a:ext cx="10972800" cy="704498"/>
+            <a:ext cx="10972800" cy="680222"/>
           </a:xfrm>
         </p:spPr>
         <p:txBody>
@@ -4591,8 +4592,8 @@
         </p:nvSpPr>
         <p:spPr>
           <a:xfrm>
-            <a:off x="609600" y="979136"/>
-            <a:ext cx="10972800" cy="2737130"/>
+            <a:off x="609600" y="954860"/>
+            <a:ext cx="10972800" cy="714121"/>
           </a:xfrm>
         </p:spPr>
         <p:txBody>
@@ -4601,49 +4602,35 @@
           <a:p>
             <a:r>
               <a:rPr lang="pt-BR" dirty="0"/>
-              <a:t>Posição:</a:t>
-            </a:r>
-          </a:p>
-          <a:p>
-            <a:pPr lvl="1"/>
-            <a:r>
-              <a:rPr lang="pt-BR" dirty="0"/>
-              <a:t>Cálculo do RSSI é feito automaticamente por função já existente na biblioteca do módulo ESP8266;</a:t>
-            </a:r>
-          </a:p>
-          <a:p>
-            <a:pPr lvl="1"/>
-            <a:r>
-              <a:rPr lang="pt-BR" dirty="0"/>
-              <a:t>A partir do RSSI calculamos o FSPL (Atenuação de espaço livre) e daí a posição</a:t>
+              <a:t>Perda de propagação no espaço livre:</a:t>
             </a:r>
           </a:p>
         </p:txBody>
       </p:sp>
       <p:pic>
         <p:nvPicPr>
-          <p:cNvPr id="4" name="Imagem 3"/>
+          <p:cNvPr id="4" name="Imagem 3">
+            <a:extLst>
+              <a:ext uri="{FF2B5EF4-FFF2-40B4-BE49-F238E27FC236}">
+                <a16:creationId xmlns:a16="http://schemas.microsoft.com/office/drawing/2014/main" id="{72B2E2F5-4892-41DC-8205-F999B13188F4}"/>
+              </a:ext>
+            </a:extLst>
+          </p:cNvPr>
           <p:cNvPicPr>
             <a:picLocks noChangeAspect="1"/>
           </p:cNvPicPr>
           <p:nvPr/>
         </p:nvPicPr>
         <p:blipFill>
-          <a:blip r:embed="rId2">
-            <a:extLst>
-              <a:ext uri="{28A0092B-C50C-407E-A947-70E740481C1C}">
-                <a14:useLocalDpi xmlns:a14="http://schemas.microsoft.com/office/drawing/2010/main" val="0"/>
-              </a:ext>
-            </a:extLst>
-          </a:blip>
+          <a:blip r:embed="rId2"/>
           <a:stretch>
             <a:fillRect/>
           </a:stretch>
         </p:blipFill>
         <p:spPr>
           <a:xfrm>
-            <a:off x="609600" y="3511943"/>
-            <a:ext cx="4822854" cy="3212539"/>
+            <a:off x="757858" y="1668981"/>
+            <a:ext cx="7498246" cy="4450713"/>
           </a:xfrm>
           <a:prstGeom prst="rect">
             <a:avLst/>
@@ -4652,28 +4639,28 @@
       </p:pic>
       <p:pic>
         <p:nvPicPr>
-          <p:cNvPr id="5" name="Imagem 4"/>
+          <p:cNvPr id="6" name="Imagem 5">
+            <a:extLst>
+              <a:ext uri="{FF2B5EF4-FFF2-40B4-BE49-F238E27FC236}">
+                <a16:creationId xmlns:a16="http://schemas.microsoft.com/office/drawing/2014/main" id="{13A0869D-1C3A-4154-BEC5-F0B2AC40E5F9}"/>
+              </a:ext>
+            </a:extLst>
+          </p:cNvPr>
           <p:cNvPicPr>
             <a:picLocks noChangeAspect="1"/>
           </p:cNvPicPr>
           <p:nvPr/>
         </p:nvPicPr>
         <p:blipFill>
-          <a:blip r:embed="rId3">
-            <a:extLst>
-              <a:ext uri="{28A0092B-C50C-407E-A947-70E740481C1C}">
-                <a14:useLocalDpi xmlns:a14="http://schemas.microsoft.com/office/drawing/2010/main" val="0"/>
-              </a:ext>
-            </a:extLst>
-          </a:blip>
+          <a:blip r:embed="rId3"/>
           <a:stretch>
             <a:fillRect/>
           </a:stretch>
         </p:blipFill>
         <p:spPr>
           <a:xfrm>
-            <a:off x="5911061" y="3645164"/>
-            <a:ext cx="2370167" cy="1279138"/>
+            <a:off x="8256104" y="1742909"/>
+            <a:ext cx="3364819" cy="724541"/>
           </a:xfrm>
           <a:prstGeom prst="rect">
             <a:avLst/>
@@ -4682,28 +4669,28 @@
       </p:pic>
       <p:pic>
         <p:nvPicPr>
-          <p:cNvPr id="6" name="Imagem 5"/>
+          <p:cNvPr id="7" name="Imagem 6">
+            <a:extLst>
+              <a:ext uri="{FF2B5EF4-FFF2-40B4-BE49-F238E27FC236}">
+                <a16:creationId xmlns:a16="http://schemas.microsoft.com/office/drawing/2014/main" id="{2B94C1A4-0BDC-4F0B-9319-8B4E5AE66092}"/>
+              </a:ext>
+            </a:extLst>
+          </p:cNvPr>
           <p:cNvPicPr>
             <a:picLocks noChangeAspect="1"/>
           </p:cNvPicPr>
           <p:nvPr/>
         </p:nvPicPr>
         <p:blipFill>
-          <a:blip r:embed="rId4">
-            <a:extLst>
-              <a:ext uri="{28A0092B-C50C-407E-A947-70E740481C1C}">
-                <a14:useLocalDpi xmlns:a14="http://schemas.microsoft.com/office/drawing/2010/main" val="0"/>
-              </a:ext>
-            </a:extLst>
-          </a:blip>
+          <a:blip r:embed="rId4"/>
           <a:stretch>
             <a:fillRect/>
           </a:stretch>
         </p:blipFill>
         <p:spPr>
           <a:xfrm>
-            <a:off x="8281228" y="3716266"/>
-            <a:ext cx="2200275" cy="1362075"/>
+            <a:off x="8356533" y="2684180"/>
+            <a:ext cx="2766394" cy="433444"/>
           </a:xfrm>
           <a:prstGeom prst="rect">
             <a:avLst/>
@@ -4712,38 +4699,68 @@
       </p:pic>
       <p:pic>
         <p:nvPicPr>
-          <p:cNvPr id="7" name="Imagem 6"/>
+          <p:cNvPr id="8" name="Imagem 7">
+            <a:extLst>
+              <a:ext uri="{FF2B5EF4-FFF2-40B4-BE49-F238E27FC236}">
+                <a16:creationId xmlns:a16="http://schemas.microsoft.com/office/drawing/2014/main" id="{B2217DE7-186A-4A1F-BC4D-8FA0C9D33A4A}"/>
+              </a:ext>
+            </a:extLst>
+          </p:cNvPr>
           <p:cNvPicPr>
             <a:picLocks noChangeAspect="1"/>
           </p:cNvPicPr>
           <p:nvPr/>
         </p:nvPicPr>
         <p:blipFill>
-          <a:blip r:embed="rId5">
-            <a:extLst>
-              <a:ext uri="{28A0092B-C50C-407E-A947-70E740481C1C}">
-                <a14:useLocalDpi xmlns:a14="http://schemas.microsoft.com/office/drawing/2010/main" val="0"/>
-              </a:ext>
-            </a:extLst>
-          </a:blip>
+          <a:blip r:embed="rId5"/>
           <a:stretch>
             <a:fillRect/>
           </a:stretch>
         </p:blipFill>
         <p:spPr>
           <a:xfrm>
-            <a:off x="6096000" y="4924302"/>
-            <a:ext cx="2339778" cy="1612857"/>
+            <a:off x="11122927" y="2733201"/>
+            <a:ext cx="645003" cy="335402"/>
           </a:xfrm>
           <a:prstGeom prst="rect">
             <a:avLst/>
           </a:prstGeom>
         </p:spPr>
       </p:pic>
+      <p:pic>
+        <p:nvPicPr>
+          <p:cNvPr id="9" name="Imagem 8">
+            <a:extLst>
+              <a:ext uri="{FF2B5EF4-FFF2-40B4-BE49-F238E27FC236}">
+                <a16:creationId xmlns:a16="http://schemas.microsoft.com/office/drawing/2014/main" id="{2D157810-A938-447D-8968-58A715187B03}"/>
+              </a:ext>
+            </a:extLst>
+          </p:cNvPr>
+          <p:cNvPicPr>
+            <a:picLocks noChangeAspect="1"/>
+          </p:cNvPicPr>
+          <p:nvPr/>
+        </p:nvPicPr>
+        <p:blipFill>
+          <a:blip r:embed="rId6"/>
+          <a:stretch>
+            <a:fillRect/>
+          </a:stretch>
+        </p:blipFill>
+        <p:spPr>
+          <a:xfrm>
+            <a:off x="8256104" y="4165152"/>
+            <a:ext cx="3402133" cy="433445"/>
+          </a:xfrm>
+          <a:prstGeom prst="rect">
+            <a:avLst/>
+          </a:prstGeom>
+        </p:spPr>
+      </p:pic>
     </p:spTree>
     <p:extLst>
       <p:ext uri="{BB962C8B-B14F-4D97-AF65-F5344CB8AC3E}">
-        <p14:creationId xmlns:p14="http://schemas.microsoft.com/office/powerpoint/2010/main" val="634293630"/>
+        <p14:creationId xmlns:p14="http://schemas.microsoft.com/office/powerpoint/2010/main" val="63261545"/>
       </p:ext>
     </p:extLst>
   </p:cSld>
@@ -4780,6 +4797,231 @@
             <p:ph type="title"/>
           </p:nvPr>
         </p:nvSpPr>
+        <p:spPr>
+          <a:xfrm>
+            <a:off x="609600" y="274638"/>
+            <a:ext cx="10972800" cy="704498"/>
+          </a:xfrm>
+        </p:spPr>
+        <p:txBody>
+          <a:bodyPr/>
+          <a:lstStyle/>
+          <a:p>
+            <a:r>
+              <a:rPr lang="pt-BR" dirty="0"/>
+              <a:t>Funcionamento</a:t>
+            </a:r>
+          </a:p>
+        </p:txBody>
+      </p:sp>
+      <p:sp>
+        <p:nvSpPr>
+          <p:cNvPr id="3" name="Espaço Reservado para Conteúdo 2"/>
+          <p:cNvSpPr>
+            <a:spLocks noGrp="1"/>
+          </p:cNvSpPr>
+          <p:nvPr>
+            <p:ph idx="1"/>
+          </p:nvPr>
+        </p:nvSpPr>
+        <p:spPr>
+          <a:xfrm>
+            <a:off x="609600" y="979136"/>
+            <a:ext cx="10972800" cy="2737130"/>
+          </a:xfrm>
+        </p:spPr>
+        <p:txBody>
+          <a:bodyPr/>
+          <a:lstStyle/>
+          <a:p>
+            <a:r>
+              <a:rPr lang="pt-BR" dirty="0"/>
+              <a:t>Obtendo a posição:</a:t>
+            </a:r>
+          </a:p>
+          <a:p>
+            <a:pPr lvl="1"/>
+            <a:r>
+              <a:rPr lang="pt-BR" dirty="0"/>
+              <a:t>A partir do RSSI calculamos a distância utilizando o FSPL</a:t>
+            </a:r>
+          </a:p>
+          <a:p>
+            <a:pPr lvl="1"/>
+            <a:r>
+              <a:rPr lang="pt-BR" dirty="0"/>
+              <a:t>Obtenção dos raios dos círculos</a:t>
+            </a:r>
+          </a:p>
+          <a:p>
+            <a:pPr lvl="1"/>
+            <a:r>
+              <a:rPr lang="pt-BR" dirty="0"/>
+              <a:t>Trilateração</a:t>
+            </a:r>
+          </a:p>
+        </p:txBody>
+      </p:sp>
+      <p:pic>
+        <p:nvPicPr>
+          <p:cNvPr id="5" name="Imagem 4"/>
+          <p:cNvPicPr>
+            <a:picLocks noChangeAspect="1"/>
+          </p:cNvPicPr>
+          <p:nvPr/>
+        </p:nvPicPr>
+        <p:blipFill>
+          <a:blip r:embed="rId2">
+            <a:extLst>
+              <a:ext uri="{28A0092B-C50C-407E-A947-70E740481C1C}">
+                <a14:useLocalDpi xmlns:a14="http://schemas.microsoft.com/office/drawing/2010/main" val="0"/>
+              </a:ext>
+            </a:extLst>
+          </a:blip>
+          <a:stretch>
+            <a:fillRect/>
+          </a:stretch>
+        </p:blipFill>
+        <p:spPr>
+          <a:xfrm>
+            <a:off x="6096000" y="3188351"/>
+            <a:ext cx="2370167" cy="1279138"/>
+          </a:xfrm>
+          <a:prstGeom prst="rect">
+            <a:avLst/>
+          </a:prstGeom>
+        </p:spPr>
+      </p:pic>
+      <p:pic>
+        <p:nvPicPr>
+          <p:cNvPr id="6" name="Imagem 5"/>
+          <p:cNvPicPr>
+            <a:picLocks noChangeAspect="1"/>
+          </p:cNvPicPr>
+          <p:nvPr/>
+        </p:nvPicPr>
+        <p:blipFill>
+          <a:blip r:embed="rId3">
+            <a:extLst>
+              <a:ext uri="{28A0092B-C50C-407E-A947-70E740481C1C}">
+                <a14:useLocalDpi xmlns:a14="http://schemas.microsoft.com/office/drawing/2010/main" val="0"/>
+              </a:ext>
+            </a:extLst>
+          </a:blip>
+          <a:stretch>
+            <a:fillRect/>
+          </a:stretch>
+        </p:blipFill>
+        <p:spPr>
+          <a:xfrm>
+            <a:off x="8928780" y="3188351"/>
+            <a:ext cx="2200275" cy="1362075"/>
+          </a:xfrm>
+          <a:prstGeom prst="rect">
+            <a:avLst/>
+          </a:prstGeom>
+        </p:spPr>
+      </p:pic>
+      <p:pic>
+        <p:nvPicPr>
+          <p:cNvPr id="7" name="Imagem 6"/>
+          <p:cNvPicPr>
+            <a:picLocks noChangeAspect="1"/>
+          </p:cNvPicPr>
+          <p:nvPr/>
+        </p:nvPicPr>
+        <p:blipFill>
+          <a:blip r:embed="rId4">
+            <a:extLst>
+              <a:ext uri="{28A0092B-C50C-407E-A947-70E740481C1C}">
+                <a14:useLocalDpi xmlns:a14="http://schemas.microsoft.com/office/drawing/2010/main" val="0"/>
+              </a:ext>
+            </a:extLst>
+          </a:blip>
+          <a:stretch>
+            <a:fillRect/>
+          </a:stretch>
+        </p:blipFill>
+        <p:spPr>
+          <a:xfrm>
+            <a:off x="6195381" y="4467489"/>
+            <a:ext cx="2339778" cy="1612857"/>
+          </a:xfrm>
+          <a:prstGeom prst="rect">
+            <a:avLst/>
+          </a:prstGeom>
+        </p:spPr>
+      </p:pic>
+      <p:pic>
+        <p:nvPicPr>
+          <p:cNvPr id="11" name="Imagem 10">
+            <a:extLst>
+              <a:ext uri="{FF2B5EF4-FFF2-40B4-BE49-F238E27FC236}">
+                <a16:creationId xmlns:a16="http://schemas.microsoft.com/office/drawing/2014/main" id="{17DA9E39-6FD3-4789-80B9-99FDC94AB60A}"/>
+              </a:ext>
+            </a:extLst>
+          </p:cNvPr>
+          <p:cNvPicPr>
+            <a:picLocks noChangeAspect="1"/>
+          </p:cNvPicPr>
+          <p:nvPr/>
+        </p:nvPicPr>
+        <p:blipFill>
+          <a:blip r:embed="rId5"/>
+          <a:stretch>
+            <a:fillRect/>
+          </a:stretch>
+        </p:blipFill>
+        <p:spPr>
+          <a:xfrm>
+            <a:off x="2054088" y="3188351"/>
+            <a:ext cx="3472069" cy="3485024"/>
+          </a:xfrm>
+          <a:prstGeom prst="rect">
+            <a:avLst/>
+          </a:prstGeom>
+        </p:spPr>
+      </p:pic>
+    </p:spTree>
+    <p:extLst>
+      <p:ext uri="{BB962C8B-B14F-4D97-AF65-F5344CB8AC3E}">
+        <p14:creationId xmlns:p14="http://schemas.microsoft.com/office/powerpoint/2010/main" val="634293630"/>
+      </p:ext>
+    </p:extLst>
+  </p:cSld>
+  <p:clrMapOvr>
+    <a:masterClrMapping/>
+  </p:clrMapOvr>
+</p:sld>
+</file>
+
+<file path=ppt/slides/slide12.xml><?xml version="1.0" encoding="utf-8"?>
+<p:sld xmlns:a="http://schemas.openxmlformats.org/drawingml/2006/main" xmlns:r="http://schemas.openxmlformats.org/officeDocument/2006/relationships" xmlns:p="http://schemas.openxmlformats.org/presentationml/2006/main">
+  <p:cSld>
+    <p:spTree>
+      <p:nvGrpSpPr>
+        <p:cNvPr id="1" name=""/>
+        <p:cNvGrpSpPr/>
+        <p:nvPr/>
+      </p:nvGrpSpPr>
+      <p:grpSpPr>
+        <a:xfrm>
+          <a:off x="0" y="0"/>
+          <a:ext cx="0" cy="0"/>
+          <a:chOff x="0" y="0"/>
+          <a:chExt cx="0" cy="0"/>
+        </a:xfrm>
+      </p:grpSpPr>
+      <p:sp>
+        <p:nvSpPr>
+          <p:cNvPr id="2" name="Título 1"/>
+          <p:cNvSpPr>
+            <a:spLocks noGrp="1"/>
+          </p:cNvSpPr>
+          <p:nvPr>
+            <p:ph type="title"/>
+          </p:nvPr>
+        </p:nvSpPr>
         <p:spPr/>
         <p:txBody>
           <a:bodyPr/>
@@ -4848,8 +5090,13 @@
             <a:pPr lvl="1"/>
             <a:r>
               <a:rPr lang="pt-BR" dirty="0"/>
-              <a:t>Recebe a informação do RSSI, calcula o FSPL e a posição da pessoa</a:t>
-            </a:r>
+              <a:t>Recebe a informação do RSSI, calcula a distância com a fórmula do FSPL, e a posição da pessoa a partir da </a:t>
+            </a:r>
+            <a:r>
+              <a:rPr lang="pt-BR" dirty="0" err="1"/>
+              <a:t>trilateração</a:t>
+            </a:r>
+            <a:endParaRPr lang="pt-BR" dirty="0"/>
           </a:p>
           <a:p>
             <a:pPr lvl="1"/>
@@ -4879,7 +5126,7 @@
 </p:sld>
 </file>
 
-<file path=ppt/slides/slide12.xml><?xml version="1.0" encoding="utf-8"?>
+<file path=ppt/slides/slide13.xml><?xml version="1.0" encoding="utf-8"?>
 <p:sld xmlns:a="http://schemas.openxmlformats.org/drawingml/2006/main" xmlns:r="http://schemas.openxmlformats.org/officeDocument/2006/relationships" xmlns:p="http://schemas.openxmlformats.org/presentationml/2006/main">
   <p:cSld>
     <p:spTree>
@@ -6369,7 +6616,7 @@
             <a:pPr algn="just"/>
             <a:r>
               <a:rPr lang="pt-BR" sz="2400" dirty="0"/>
-              <a:t>Sensor Infravermelho: O funcionário passa pelo sensor, a ESP8266 (sensor), dispara um Broadcast UDP.</a:t>
+              <a:t>Sensor Infravermelho: O funcionário passa pelo sensor, a ESP8266 (sensor) dispara um Broadcast UDP.</a:t>
             </a:r>
           </a:p>
           <a:p>
@@ -6383,7 +6630,7 @@
             <a:pPr algn="just"/>
             <a:r>
               <a:rPr lang="pt-BR" sz="2400" dirty="0"/>
-              <a:t>ESP8266 (pessoa): Recebe o UDP pela porta definida e retorna o seu MAC.</a:t>
+              <a:t>ESP8266 (pessoa): Recebe o UDP pela porta definida e utilizando o utilizando o protocolo ARP, retorna o seu MAC.</a:t>
             </a:r>
           </a:p>
           <a:p>
@@ -6629,120 +6876,6 @@
 </file>
 
 <file path=ppt/slides/slide8.xml><?xml version="1.0" encoding="utf-8"?>
-<p:sld xmlns:a="http://schemas.openxmlformats.org/drawingml/2006/main" xmlns:r="http://schemas.openxmlformats.org/officeDocument/2006/relationships" xmlns:p="http://schemas.openxmlformats.org/presentationml/2006/main">
-  <p:cSld>
-    <p:spTree>
-      <p:nvGrpSpPr>
-        <p:cNvPr id="1" name=""/>
-        <p:cNvGrpSpPr/>
-        <p:nvPr/>
-      </p:nvGrpSpPr>
-      <p:grpSpPr>
-        <a:xfrm>
-          <a:off x="0" y="0"/>
-          <a:ext cx="0" cy="0"/>
-          <a:chOff x="0" y="0"/>
-          <a:chExt cx="0" cy="0"/>
-        </a:xfrm>
-      </p:grpSpPr>
-      <p:sp>
-        <p:nvSpPr>
-          <p:cNvPr id="2" name="Título 1"/>
-          <p:cNvSpPr>
-            <a:spLocks noGrp="1"/>
-          </p:cNvSpPr>
-          <p:nvPr>
-            <p:ph type="title"/>
-          </p:nvPr>
-        </p:nvSpPr>
-        <p:spPr>
-          <a:xfrm>
-            <a:off x="609600" y="274638"/>
-            <a:ext cx="10972800" cy="680222"/>
-          </a:xfrm>
-        </p:spPr>
-        <p:txBody>
-          <a:bodyPr/>
-          <a:lstStyle/>
-          <a:p>
-            <a:r>
-              <a:rPr lang="pt-BR" dirty="0"/>
-              <a:t>Funcionamento</a:t>
-            </a:r>
-          </a:p>
-        </p:txBody>
-      </p:sp>
-      <p:sp>
-        <p:nvSpPr>
-          <p:cNvPr id="3" name="Espaço Reservado para Conteúdo 2"/>
-          <p:cNvSpPr>
-            <a:spLocks noGrp="1"/>
-          </p:cNvSpPr>
-          <p:nvPr>
-            <p:ph idx="1"/>
-          </p:nvPr>
-        </p:nvSpPr>
-        <p:spPr>
-          <a:xfrm>
-            <a:off x="609600" y="954860"/>
-            <a:ext cx="10972800" cy="714121"/>
-          </a:xfrm>
-        </p:spPr>
-        <p:txBody>
-          <a:bodyPr/>
-          <a:lstStyle/>
-          <a:p>
-            <a:r>
-              <a:rPr lang="pt-BR" dirty="0"/>
-              <a:t>Posição:</a:t>
-            </a:r>
-          </a:p>
-        </p:txBody>
-      </p:sp>
-      <p:pic>
-        <p:nvPicPr>
-          <p:cNvPr id="5" name="Imagem 4"/>
-          <p:cNvPicPr>
-            <a:picLocks noChangeAspect="1"/>
-          </p:cNvPicPr>
-          <p:nvPr/>
-        </p:nvPicPr>
-        <p:blipFill>
-          <a:blip r:embed="rId2">
-            <a:extLst>
-              <a:ext uri="{28A0092B-C50C-407E-A947-70E740481C1C}">
-                <a14:useLocalDpi xmlns:a14="http://schemas.microsoft.com/office/drawing/2010/main" val="0"/>
-              </a:ext>
-            </a:extLst>
-          </a:blip>
-          <a:stretch>
-            <a:fillRect/>
-          </a:stretch>
-        </p:blipFill>
-        <p:spPr>
-          <a:xfrm>
-            <a:off x="2258436" y="1668981"/>
-            <a:ext cx="7448550" cy="4903774"/>
-          </a:xfrm>
-          <a:prstGeom prst="rect">
-            <a:avLst/>
-          </a:prstGeom>
-        </p:spPr>
-      </p:pic>
-    </p:spTree>
-    <p:extLst>
-      <p:ext uri="{BB962C8B-B14F-4D97-AF65-F5344CB8AC3E}">
-        <p14:creationId xmlns:p14="http://schemas.microsoft.com/office/powerpoint/2010/main" val="63261545"/>
-      </p:ext>
-    </p:extLst>
-  </p:cSld>
-  <p:clrMapOvr>
-    <a:masterClrMapping/>
-  </p:clrMapOvr>
-</p:sld>
-</file>
-
-<file path=ppt/slides/slide9.xml><?xml version="1.0" encoding="utf-8"?>
 <p:sld xmlns:a="http://schemas.openxmlformats.org/drawingml/2006/main" xmlns:r="http://schemas.openxmlformats.org/officeDocument/2006/relationships" xmlns:p="http://schemas.openxmlformats.org/presentationml/2006/main">
   <p:cSld>
     <p:spTree>
@@ -6856,6 +6989,144 @@
     <p:extLst>
       <p:ext uri="{BB962C8B-B14F-4D97-AF65-F5344CB8AC3E}">
         <p14:creationId xmlns:p14="http://schemas.microsoft.com/office/powerpoint/2010/main" val="2264565989"/>
+      </p:ext>
+    </p:extLst>
+  </p:cSld>
+  <p:clrMapOvr>
+    <a:masterClrMapping/>
+  </p:clrMapOvr>
+</p:sld>
+</file>
+
+<file path=ppt/slides/slide9.xml><?xml version="1.0" encoding="utf-8"?>
+<p:sld xmlns:a="http://schemas.openxmlformats.org/drawingml/2006/main" xmlns:r="http://schemas.openxmlformats.org/officeDocument/2006/relationships" xmlns:p="http://schemas.openxmlformats.org/presentationml/2006/main">
+  <p:cSld>
+    <p:spTree>
+      <p:nvGrpSpPr>
+        <p:cNvPr id="1" name=""/>
+        <p:cNvGrpSpPr/>
+        <p:nvPr/>
+      </p:nvGrpSpPr>
+      <p:grpSpPr>
+        <a:xfrm>
+          <a:off x="0" y="0"/>
+          <a:ext cx="0" cy="0"/>
+          <a:chOff x="0" y="0"/>
+          <a:chExt cx="0" cy="0"/>
+        </a:xfrm>
+      </p:grpSpPr>
+      <p:sp>
+        <p:nvSpPr>
+          <p:cNvPr id="2" name="Título 1">
+            <a:extLst>
+              <a:ext uri="{FF2B5EF4-FFF2-40B4-BE49-F238E27FC236}">
+                <a16:creationId xmlns:a16="http://schemas.microsoft.com/office/drawing/2014/main" id="{D657C240-ABA4-4927-AB97-4D3E4134AF98}"/>
+              </a:ext>
+            </a:extLst>
+          </p:cNvPr>
+          <p:cNvSpPr>
+            <a:spLocks noGrp="1"/>
+          </p:cNvSpPr>
+          <p:nvPr>
+            <p:ph type="title"/>
+          </p:nvPr>
+        </p:nvSpPr>
+        <p:spPr/>
+        <p:txBody>
+          <a:bodyPr/>
+          <a:lstStyle/>
+          <a:p>
+            <a:r>
+              <a:rPr lang="pt-BR" dirty="0"/>
+              <a:t>Funcionamento</a:t>
+            </a:r>
+          </a:p>
+        </p:txBody>
+      </p:sp>
+      <p:sp>
+        <p:nvSpPr>
+          <p:cNvPr id="3" name="Espaço Reservado para Conteúdo 2">
+            <a:extLst>
+              <a:ext uri="{FF2B5EF4-FFF2-40B4-BE49-F238E27FC236}">
+                <a16:creationId xmlns:a16="http://schemas.microsoft.com/office/drawing/2014/main" id="{EB832D47-4175-4996-8BA0-D77D002E75F6}"/>
+              </a:ext>
+            </a:extLst>
+          </p:cNvPr>
+          <p:cNvSpPr>
+            <a:spLocks noGrp="1"/>
+          </p:cNvSpPr>
+          <p:nvPr>
+            <p:ph idx="1"/>
+          </p:nvPr>
+        </p:nvSpPr>
+        <p:spPr/>
+        <p:txBody>
+          <a:bodyPr/>
+          <a:lstStyle/>
+          <a:p>
+            <a:r>
+              <a:rPr lang="pt-BR" dirty="0"/>
+              <a:t>RSSI (</a:t>
+            </a:r>
+            <a:r>
+              <a:rPr lang="pt-BR" dirty="0" err="1"/>
+              <a:t>Received</a:t>
+            </a:r>
+            <a:r>
+              <a:rPr lang="pt-BR" dirty="0"/>
+              <a:t> </a:t>
+            </a:r>
+            <a:r>
+              <a:rPr lang="pt-BR" dirty="0" err="1"/>
+              <a:t>Signal</a:t>
+            </a:r>
+            <a:r>
+              <a:rPr lang="pt-BR" dirty="0"/>
+              <a:t> </a:t>
+            </a:r>
+            <a:r>
+              <a:rPr lang="pt-BR" dirty="0" err="1"/>
+              <a:t>Strength</a:t>
+            </a:r>
+            <a:r>
+              <a:rPr lang="pt-BR" dirty="0"/>
+              <a:t> </a:t>
+            </a:r>
+            <a:r>
+              <a:rPr lang="pt-BR" dirty="0" err="1"/>
+              <a:t>Indicator</a:t>
+            </a:r>
+            <a:r>
+              <a:rPr lang="pt-BR" dirty="0"/>
+              <a:t>):</a:t>
+            </a:r>
+          </a:p>
+          <a:p>
+            <a:pPr lvl="1"/>
+            <a:r>
+              <a:rPr lang="pt-BR" dirty="0"/>
+              <a:t>Indicador de força/intensidade do sinal recebido</a:t>
+            </a:r>
+          </a:p>
+          <a:p>
+            <a:pPr lvl="1"/>
+            <a:r>
+              <a:rPr lang="pt-BR" dirty="0"/>
+              <a:t>O cálculo do RSSI é feito automaticamente por uma função já existente na biblioteca do módulo ESP8266 que retorna um valor em dB;</a:t>
+            </a:r>
+          </a:p>
+          <a:p>
+            <a:pPr marL="0" indent="0">
+              <a:buNone/>
+            </a:pPr>
+            <a:endParaRPr lang="pt-BR" dirty="0"/>
+          </a:p>
+        </p:txBody>
+      </p:sp>
+    </p:spTree>
+    <p:extLst>
+      <p:ext uri="{BB962C8B-B14F-4D97-AF65-F5344CB8AC3E}">
+        <p14:creationId xmlns:p14="http://schemas.microsoft.com/office/powerpoint/2010/main" val="3410326930"/>
       </p:ext>
     </p:extLst>
   </p:cSld>

</xml_diff>

<commit_message>
ppt apresentação parte Cai2.
</commit_message>
<xml_diff>
--- a/Documentação/Apresentação Projeto PID.pptx
+++ b/Documentação/Apresentação Projeto PID.pptx
@@ -12,12 +12,11 @@
     <p:sldId id="263" r:id="rId6"/>
     <p:sldId id="265" r:id="rId7"/>
     <p:sldId id="266" r:id="rId8"/>
-    <p:sldId id="260" r:id="rId9"/>
-    <p:sldId id="268" r:id="rId10"/>
-    <p:sldId id="259" r:id="rId11"/>
-    <p:sldId id="258" r:id="rId12"/>
-    <p:sldId id="261" r:id="rId13"/>
-    <p:sldId id="267" r:id="rId14"/>
+    <p:sldId id="268" r:id="rId9"/>
+    <p:sldId id="259" r:id="rId10"/>
+    <p:sldId id="258" r:id="rId11"/>
+    <p:sldId id="261" r:id="rId12"/>
+    <p:sldId id="267" r:id="rId13"/>
   </p:sldIdLst>
   <p:sldSz cx="12192000" cy="6858000"/>
   <p:notesSz cx="6858000" cy="9144000"/>
@@ -4566,240 +4565,6 @@
         <p:spPr>
           <a:xfrm>
             <a:off x="609600" y="274638"/>
-            <a:ext cx="10972800" cy="680222"/>
-          </a:xfrm>
-        </p:spPr>
-        <p:txBody>
-          <a:bodyPr/>
-          <a:lstStyle/>
-          <a:p>
-            <a:r>
-              <a:rPr lang="pt-BR" dirty="0"/>
-              <a:t>Funcionamento</a:t>
-            </a:r>
-          </a:p>
-        </p:txBody>
-      </p:sp>
-      <p:sp>
-        <p:nvSpPr>
-          <p:cNvPr id="3" name="Espaço Reservado para Conteúdo 2"/>
-          <p:cNvSpPr>
-            <a:spLocks noGrp="1"/>
-          </p:cNvSpPr>
-          <p:nvPr>
-            <p:ph idx="1"/>
-          </p:nvPr>
-        </p:nvSpPr>
-        <p:spPr>
-          <a:xfrm>
-            <a:off x="609600" y="954860"/>
-            <a:ext cx="10972800" cy="714121"/>
-          </a:xfrm>
-        </p:spPr>
-        <p:txBody>
-          <a:bodyPr/>
-          <a:lstStyle/>
-          <a:p>
-            <a:r>
-              <a:rPr lang="pt-BR" dirty="0"/>
-              <a:t>Perda de propagação no espaço livre:</a:t>
-            </a:r>
-          </a:p>
-        </p:txBody>
-      </p:sp>
-      <p:pic>
-        <p:nvPicPr>
-          <p:cNvPr id="4" name="Imagem 3">
-            <a:extLst>
-              <a:ext uri="{FF2B5EF4-FFF2-40B4-BE49-F238E27FC236}">
-                <a16:creationId xmlns:a16="http://schemas.microsoft.com/office/drawing/2014/main" id="{72B2E2F5-4892-41DC-8205-F999B13188F4}"/>
-              </a:ext>
-            </a:extLst>
-          </p:cNvPr>
-          <p:cNvPicPr>
-            <a:picLocks noChangeAspect="1"/>
-          </p:cNvPicPr>
-          <p:nvPr/>
-        </p:nvPicPr>
-        <p:blipFill>
-          <a:blip r:embed="rId2"/>
-          <a:stretch>
-            <a:fillRect/>
-          </a:stretch>
-        </p:blipFill>
-        <p:spPr>
-          <a:xfrm>
-            <a:off x="757858" y="1668981"/>
-            <a:ext cx="7498246" cy="4450713"/>
-          </a:xfrm>
-          <a:prstGeom prst="rect">
-            <a:avLst/>
-          </a:prstGeom>
-        </p:spPr>
-      </p:pic>
-      <p:pic>
-        <p:nvPicPr>
-          <p:cNvPr id="6" name="Imagem 5">
-            <a:extLst>
-              <a:ext uri="{FF2B5EF4-FFF2-40B4-BE49-F238E27FC236}">
-                <a16:creationId xmlns:a16="http://schemas.microsoft.com/office/drawing/2014/main" id="{13A0869D-1C3A-4154-BEC5-F0B2AC40E5F9}"/>
-              </a:ext>
-            </a:extLst>
-          </p:cNvPr>
-          <p:cNvPicPr>
-            <a:picLocks noChangeAspect="1"/>
-          </p:cNvPicPr>
-          <p:nvPr/>
-        </p:nvPicPr>
-        <p:blipFill>
-          <a:blip r:embed="rId3"/>
-          <a:stretch>
-            <a:fillRect/>
-          </a:stretch>
-        </p:blipFill>
-        <p:spPr>
-          <a:xfrm>
-            <a:off x="8256104" y="1742909"/>
-            <a:ext cx="3364819" cy="724541"/>
-          </a:xfrm>
-          <a:prstGeom prst="rect">
-            <a:avLst/>
-          </a:prstGeom>
-        </p:spPr>
-      </p:pic>
-      <p:pic>
-        <p:nvPicPr>
-          <p:cNvPr id="7" name="Imagem 6">
-            <a:extLst>
-              <a:ext uri="{FF2B5EF4-FFF2-40B4-BE49-F238E27FC236}">
-                <a16:creationId xmlns:a16="http://schemas.microsoft.com/office/drawing/2014/main" id="{2B94C1A4-0BDC-4F0B-9319-8B4E5AE66092}"/>
-              </a:ext>
-            </a:extLst>
-          </p:cNvPr>
-          <p:cNvPicPr>
-            <a:picLocks noChangeAspect="1"/>
-          </p:cNvPicPr>
-          <p:nvPr/>
-        </p:nvPicPr>
-        <p:blipFill>
-          <a:blip r:embed="rId4"/>
-          <a:stretch>
-            <a:fillRect/>
-          </a:stretch>
-        </p:blipFill>
-        <p:spPr>
-          <a:xfrm>
-            <a:off x="8356533" y="2684180"/>
-            <a:ext cx="2766394" cy="433444"/>
-          </a:xfrm>
-          <a:prstGeom prst="rect">
-            <a:avLst/>
-          </a:prstGeom>
-        </p:spPr>
-      </p:pic>
-      <p:pic>
-        <p:nvPicPr>
-          <p:cNvPr id="8" name="Imagem 7">
-            <a:extLst>
-              <a:ext uri="{FF2B5EF4-FFF2-40B4-BE49-F238E27FC236}">
-                <a16:creationId xmlns:a16="http://schemas.microsoft.com/office/drawing/2014/main" id="{B2217DE7-186A-4A1F-BC4D-8FA0C9D33A4A}"/>
-              </a:ext>
-            </a:extLst>
-          </p:cNvPr>
-          <p:cNvPicPr>
-            <a:picLocks noChangeAspect="1"/>
-          </p:cNvPicPr>
-          <p:nvPr/>
-        </p:nvPicPr>
-        <p:blipFill>
-          <a:blip r:embed="rId5"/>
-          <a:stretch>
-            <a:fillRect/>
-          </a:stretch>
-        </p:blipFill>
-        <p:spPr>
-          <a:xfrm>
-            <a:off x="11122927" y="2733201"/>
-            <a:ext cx="645003" cy="335402"/>
-          </a:xfrm>
-          <a:prstGeom prst="rect">
-            <a:avLst/>
-          </a:prstGeom>
-        </p:spPr>
-      </p:pic>
-      <p:pic>
-        <p:nvPicPr>
-          <p:cNvPr id="9" name="Imagem 8">
-            <a:extLst>
-              <a:ext uri="{FF2B5EF4-FFF2-40B4-BE49-F238E27FC236}">
-                <a16:creationId xmlns:a16="http://schemas.microsoft.com/office/drawing/2014/main" id="{2D157810-A938-447D-8968-58A715187B03}"/>
-              </a:ext>
-            </a:extLst>
-          </p:cNvPr>
-          <p:cNvPicPr>
-            <a:picLocks noChangeAspect="1"/>
-          </p:cNvPicPr>
-          <p:nvPr/>
-        </p:nvPicPr>
-        <p:blipFill>
-          <a:blip r:embed="rId6"/>
-          <a:stretch>
-            <a:fillRect/>
-          </a:stretch>
-        </p:blipFill>
-        <p:spPr>
-          <a:xfrm>
-            <a:off x="8256104" y="4165152"/>
-            <a:ext cx="3402133" cy="433445"/>
-          </a:xfrm>
-          <a:prstGeom prst="rect">
-            <a:avLst/>
-          </a:prstGeom>
-        </p:spPr>
-      </p:pic>
-    </p:spTree>
-    <p:extLst>
-      <p:ext uri="{BB962C8B-B14F-4D97-AF65-F5344CB8AC3E}">
-        <p14:creationId xmlns:p14="http://schemas.microsoft.com/office/powerpoint/2010/main" val="63261545"/>
-      </p:ext>
-    </p:extLst>
-  </p:cSld>
-  <p:clrMapOvr>
-    <a:masterClrMapping/>
-  </p:clrMapOvr>
-</p:sld>
-</file>
-
-<file path=ppt/slides/slide11.xml><?xml version="1.0" encoding="utf-8"?>
-<p:sld xmlns:a="http://schemas.openxmlformats.org/drawingml/2006/main" xmlns:r="http://schemas.openxmlformats.org/officeDocument/2006/relationships" xmlns:p="http://schemas.openxmlformats.org/presentationml/2006/main">
-  <p:cSld>
-    <p:spTree>
-      <p:nvGrpSpPr>
-        <p:cNvPr id="1" name=""/>
-        <p:cNvGrpSpPr/>
-        <p:nvPr/>
-      </p:nvGrpSpPr>
-      <p:grpSpPr>
-        <a:xfrm>
-          <a:off x="0" y="0"/>
-          <a:ext cx="0" cy="0"/>
-          <a:chOff x="0" y="0"/>
-          <a:chExt cx="0" cy="0"/>
-        </a:xfrm>
-      </p:grpSpPr>
-      <p:sp>
-        <p:nvSpPr>
-          <p:cNvPr id="2" name="Título 1"/>
-          <p:cNvSpPr>
-            <a:spLocks noGrp="1"/>
-          </p:cNvSpPr>
-          <p:nvPr>
-            <p:ph type="title"/>
-          </p:nvPr>
-        </p:nvSpPr>
-        <p:spPr>
-          <a:xfrm>
-            <a:off x="609600" y="274638"/>
             <a:ext cx="10972800" cy="704498"/>
           </a:xfrm>
         </p:spPr>
@@ -4995,7 +4760,7 @@
 </p:sld>
 </file>
 
-<file path=ppt/slides/slide12.xml><?xml version="1.0" encoding="utf-8"?>
+<file path=ppt/slides/slide11.xml><?xml version="1.0" encoding="utf-8"?>
 <p:sld xmlns:a="http://schemas.openxmlformats.org/drawingml/2006/main" xmlns:r="http://schemas.openxmlformats.org/officeDocument/2006/relationships" xmlns:p="http://schemas.openxmlformats.org/presentationml/2006/main">
   <p:cSld>
     <p:spTree>
@@ -5126,7 +4891,7 @@
 </p:sld>
 </file>
 
-<file path=ppt/slides/slide13.xml><?xml version="1.0" encoding="utf-8"?>
+<file path=ppt/slides/slide12.xml><?xml version="1.0" encoding="utf-8"?>
 <p:sld xmlns:a="http://schemas.openxmlformats.org/drawingml/2006/main" xmlns:r="http://schemas.openxmlformats.org/officeDocument/2006/relationships" xmlns:p="http://schemas.openxmlformats.org/presentationml/2006/main">
   <p:cSld>
     <p:spTree>
@@ -5922,6 +5687,16 @@
                 <a:cs typeface="Arial" pitchFamily="34" charset="0"/>
               </a:rPr>
               <a:t>Reconhecer em qual sala e andar o funcionário se encontra.</a:t>
+            </a:r>
+          </a:p>
+          <a:p>
+            <a:pPr algn="just"/>
+            <a:r>
+              <a:rPr lang="pt-BR" dirty="0">
+                <a:latin typeface="Arial" pitchFamily="34" charset="0"/>
+                <a:cs typeface="Arial" pitchFamily="34" charset="0"/>
+              </a:rPr>
+              <a:t>Identificar pessoa.</a:t>
             </a:r>
           </a:p>
           <a:p>
@@ -6894,101 +6669,124 @@
       </p:grpSpPr>
       <p:sp>
         <p:nvSpPr>
-          <p:cNvPr id="2" name="Título 1"/>
-          <p:cNvSpPr>
-            <a:spLocks noGrp="1"/>
-          </p:cNvSpPr>
-          <p:nvPr>
-            <p:ph type="title"/>
-          </p:nvPr>
-        </p:nvSpPr>
-        <p:spPr>
-          <a:xfrm>
-            <a:off x="609600" y="179924"/>
-            <a:ext cx="10972800" cy="1143000"/>
-          </a:xfrm>
-        </p:spPr>
-        <p:txBody>
-          <a:bodyPr/>
-          <a:lstStyle/>
-          <a:p>
-            <a:r>
-              <a:rPr lang="pt-BR" dirty="0"/>
-              <a:t>Funcionamento</a:t>
-            </a:r>
-          </a:p>
-        </p:txBody>
-      </p:sp>
-      <p:sp>
-        <p:nvSpPr>
-          <p:cNvPr id="3" name="Espaço Reservado para Conteúdo 2"/>
-          <p:cNvSpPr>
-            <a:spLocks noGrp="1"/>
-          </p:cNvSpPr>
-          <p:nvPr>
-            <p:ph idx="1"/>
-          </p:nvPr>
-        </p:nvSpPr>
-        <p:spPr>
-          <a:xfrm>
-            <a:off x="609600" y="1267094"/>
-            <a:ext cx="10972800" cy="4525963"/>
-          </a:xfrm>
-        </p:spPr>
-        <p:txBody>
-          <a:bodyPr/>
-          <a:lstStyle/>
-          <a:p>
-            <a:r>
-              <a:rPr lang="pt-BR" dirty="0"/>
-              <a:t>Reconhecimento da pessoa:</a:t>
-            </a:r>
-          </a:p>
-          <a:p>
-            <a:endParaRPr lang="pt-BR" dirty="0"/>
-          </a:p>
-        </p:txBody>
-      </p:sp>
-      <p:pic>
-        <p:nvPicPr>
-          <p:cNvPr id="10" name="Imagem 9">
+          <p:cNvPr id="2" name="Título 1">
             <a:extLst>
               <a:ext uri="{FF2B5EF4-FFF2-40B4-BE49-F238E27FC236}">
-                <a16:creationId xmlns:a16="http://schemas.microsoft.com/office/drawing/2014/main" id="{C6CC0296-3456-4172-8DB9-6148A9C72B33}"/>
+                <a16:creationId xmlns:a16="http://schemas.microsoft.com/office/drawing/2014/main" id="{D657C240-ABA4-4927-AB97-4D3E4134AF98}"/>
               </a:ext>
             </a:extLst>
           </p:cNvPr>
-          <p:cNvPicPr>
-            <a:picLocks noChangeAspect="1"/>
-          </p:cNvPicPr>
-          <p:nvPr/>
-        </p:nvPicPr>
-        <p:blipFill>
-          <a:blip r:embed="rId2">
+          <p:cNvSpPr>
+            <a:spLocks noGrp="1"/>
+          </p:cNvSpPr>
+          <p:nvPr>
+            <p:ph type="title"/>
+          </p:nvPr>
+        </p:nvSpPr>
+        <p:spPr/>
+        <p:txBody>
+          <a:bodyPr/>
+          <a:lstStyle/>
+          <a:p>
+            <a:r>
+              <a:rPr lang="pt-BR" dirty="0"/>
+              <a:t>Funcionamento</a:t>
+            </a:r>
+          </a:p>
+        </p:txBody>
+      </p:sp>
+      <p:sp>
+        <p:nvSpPr>
+          <p:cNvPr id="3" name="Espaço Reservado para Conteúdo 2">
             <a:extLst>
-              <a:ext uri="{28A0092B-C50C-407E-A947-70E740481C1C}">
-                <a14:useLocalDpi xmlns:a14="http://schemas.microsoft.com/office/drawing/2010/main" val="0"/>
+              <a:ext uri="{FF2B5EF4-FFF2-40B4-BE49-F238E27FC236}">
+                <a16:creationId xmlns:a16="http://schemas.microsoft.com/office/drawing/2014/main" id="{EB832D47-4175-4996-8BA0-D77D002E75F6}"/>
               </a:ext>
             </a:extLst>
-          </a:blip>
-          <a:stretch>
-            <a:fillRect/>
-          </a:stretch>
-        </p:blipFill>
-        <p:spPr>
-          <a:xfrm>
-            <a:off x="808633" y="2115871"/>
-            <a:ext cx="9687089" cy="4192856"/>
-          </a:xfrm>
-          <a:prstGeom prst="rect">
-            <a:avLst/>
-          </a:prstGeom>
-        </p:spPr>
-      </p:pic>
+          </p:cNvPr>
+          <p:cNvSpPr>
+            <a:spLocks noGrp="1"/>
+          </p:cNvSpPr>
+          <p:nvPr>
+            <p:ph idx="1"/>
+          </p:nvPr>
+        </p:nvSpPr>
+        <p:spPr/>
+        <p:txBody>
+          <a:bodyPr/>
+          <a:lstStyle/>
+          <a:p>
+            <a:r>
+              <a:rPr lang="pt-BR" dirty="0"/>
+              <a:t>RSSI (</a:t>
+            </a:r>
+            <a:r>
+              <a:rPr lang="pt-BR" dirty="0" err="1"/>
+              <a:t>Received</a:t>
+            </a:r>
+            <a:r>
+              <a:rPr lang="pt-BR" dirty="0"/>
+              <a:t> </a:t>
+            </a:r>
+            <a:r>
+              <a:rPr lang="pt-BR" dirty="0" err="1"/>
+              <a:t>Signal</a:t>
+            </a:r>
+            <a:r>
+              <a:rPr lang="pt-BR" dirty="0"/>
+              <a:t> </a:t>
+            </a:r>
+            <a:r>
+              <a:rPr lang="pt-BR" dirty="0" err="1"/>
+              <a:t>Strength</a:t>
+            </a:r>
+            <a:r>
+              <a:rPr lang="pt-BR" dirty="0"/>
+              <a:t> </a:t>
+            </a:r>
+            <a:r>
+              <a:rPr lang="pt-BR" dirty="0" err="1"/>
+              <a:t>Indicator</a:t>
+            </a:r>
+            <a:r>
+              <a:rPr lang="pt-BR" dirty="0"/>
+              <a:t>):</a:t>
+            </a:r>
+          </a:p>
+          <a:p>
+            <a:pPr lvl="1"/>
+            <a:r>
+              <a:rPr lang="pt-BR" dirty="0"/>
+              <a:t>Indicador de força/intensidade do sinal recebido</a:t>
+            </a:r>
+          </a:p>
+          <a:p>
+            <a:pPr lvl="1"/>
+            <a:r>
+              <a:rPr lang="pt-BR" dirty="0"/>
+              <a:t>O cálculo do RSSI é feito </a:t>
+            </a:r>
+            <a:r>
+              <a:rPr lang="pt-BR" dirty="0" err="1"/>
+              <a:t>predefinidamente</a:t>
+            </a:r>
+            <a:r>
+              <a:rPr lang="pt-BR" dirty="0"/>
+              <a:t> por uma função já existente na biblioteca do módulo ESP8266 que retorna um valor em dB;</a:t>
+            </a:r>
+          </a:p>
+          <a:p>
+            <a:pPr marL="0" indent="0">
+              <a:buNone/>
+            </a:pPr>
+            <a:endParaRPr lang="pt-BR" dirty="0"/>
+          </a:p>
+        </p:txBody>
+      </p:sp>
     </p:spTree>
     <p:extLst>
       <p:ext uri="{BB962C8B-B14F-4D97-AF65-F5344CB8AC3E}">
-        <p14:creationId xmlns:p14="http://schemas.microsoft.com/office/powerpoint/2010/main" val="2264565989"/>
+        <p14:creationId xmlns:p14="http://schemas.microsoft.com/office/powerpoint/2010/main" val="3410326930"/>
       </p:ext>
     </p:extLst>
   </p:cSld>
@@ -7017,116 +6815,212 @@
       </p:grpSpPr>
       <p:sp>
         <p:nvSpPr>
-          <p:cNvPr id="2" name="Título 1">
+          <p:cNvPr id="2" name="Título 1"/>
+          <p:cNvSpPr>
+            <a:spLocks noGrp="1"/>
+          </p:cNvSpPr>
+          <p:nvPr>
+            <p:ph type="title"/>
+          </p:nvPr>
+        </p:nvSpPr>
+        <p:spPr>
+          <a:xfrm>
+            <a:off x="609600" y="274638"/>
+            <a:ext cx="10972800" cy="680222"/>
+          </a:xfrm>
+        </p:spPr>
+        <p:txBody>
+          <a:bodyPr/>
+          <a:lstStyle/>
+          <a:p>
+            <a:r>
+              <a:rPr lang="pt-BR" dirty="0"/>
+              <a:t>Funcionamento</a:t>
+            </a:r>
+          </a:p>
+        </p:txBody>
+      </p:sp>
+      <p:sp>
+        <p:nvSpPr>
+          <p:cNvPr id="3" name="Espaço Reservado para Conteúdo 2"/>
+          <p:cNvSpPr>
+            <a:spLocks noGrp="1"/>
+          </p:cNvSpPr>
+          <p:nvPr>
+            <p:ph idx="1"/>
+          </p:nvPr>
+        </p:nvSpPr>
+        <p:spPr>
+          <a:xfrm>
+            <a:off x="609600" y="954860"/>
+            <a:ext cx="10972800" cy="714121"/>
+          </a:xfrm>
+        </p:spPr>
+        <p:txBody>
+          <a:bodyPr/>
+          <a:lstStyle/>
+          <a:p>
+            <a:r>
+              <a:rPr lang="pt-BR" dirty="0"/>
+              <a:t>Perda de propagação no espaço livre:</a:t>
+            </a:r>
+          </a:p>
+        </p:txBody>
+      </p:sp>
+      <p:pic>
+        <p:nvPicPr>
+          <p:cNvPr id="4" name="Imagem 3">
             <a:extLst>
               <a:ext uri="{FF2B5EF4-FFF2-40B4-BE49-F238E27FC236}">
-                <a16:creationId xmlns:a16="http://schemas.microsoft.com/office/drawing/2014/main" id="{D657C240-ABA4-4927-AB97-4D3E4134AF98}"/>
+                <a16:creationId xmlns:a16="http://schemas.microsoft.com/office/drawing/2014/main" id="{72B2E2F5-4892-41DC-8205-F999B13188F4}"/>
               </a:ext>
             </a:extLst>
           </p:cNvPr>
-          <p:cNvSpPr>
-            <a:spLocks noGrp="1"/>
-          </p:cNvSpPr>
-          <p:nvPr>
-            <p:ph type="title"/>
-          </p:nvPr>
-        </p:nvSpPr>
-        <p:spPr/>
-        <p:txBody>
-          <a:bodyPr/>
-          <a:lstStyle/>
-          <a:p>
-            <a:r>
-              <a:rPr lang="pt-BR" dirty="0"/>
-              <a:t>Funcionamento</a:t>
-            </a:r>
-          </a:p>
-        </p:txBody>
-      </p:sp>
-      <p:sp>
-        <p:nvSpPr>
-          <p:cNvPr id="3" name="Espaço Reservado para Conteúdo 2">
+          <p:cNvPicPr>
+            <a:picLocks noChangeAspect="1"/>
+          </p:cNvPicPr>
+          <p:nvPr/>
+        </p:nvPicPr>
+        <p:blipFill>
+          <a:blip r:embed="rId2"/>
+          <a:stretch>
+            <a:fillRect/>
+          </a:stretch>
+        </p:blipFill>
+        <p:spPr>
+          <a:xfrm>
+            <a:off x="757858" y="1668981"/>
+            <a:ext cx="7498246" cy="4450713"/>
+          </a:xfrm>
+          <a:prstGeom prst="rect">
+            <a:avLst/>
+          </a:prstGeom>
+        </p:spPr>
+      </p:pic>
+      <p:pic>
+        <p:nvPicPr>
+          <p:cNvPr id="6" name="Imagem 5">
             <a:extLst>
               <a:ext uri="{FF2B5EF4-FFF2-40B4-BE49-F238E27FC236}">
-                <a16:creationId xmlns:a16="http://schemas.microsoft.com/office/drawing/2014/main" id="{EB832D47-4175-4996-8BA0-D77D002E75F6}"/>
+                <a16:creationId xmlns:a16="http://schemas.microsoft.com/office/drawing/2014/main" id="{13A0869D-1C3A-4154-BEC5-F0B2AC40E5F9}"/>
               </a:ext>
             </a:extLst>
           </p:cNvPr>
-          <p:cNvSpPr>
-            <a:spLocks noGrp="1"/>
-          </p:cNvSpPr>
-          <p:nvPr>
-            <p:ph idx="1"/>
-          </p:nvPr>
-        </p:nvSpPr>
-        <p:spPr/>
-        <p:txBody>
-          <a:bodyPr/>
-          <a:lstStyle/>
-          <a:p>
-            <a:r>
-              <a:rPr lang="pt-BR" dirty="0"/>
-              <a:t>RSSI (</a:t>
-            </a:r>
-            <a:r>
-              <a:rPr lang="pt-BR" dirty="0" err="1"/>
-              <a:t>Received</a:t>
-            </a:r>
-            <a:r>
-              <a:rPr lang="pt-BR" dirty="0"/>
-              <a:t> </a:t>
-            </a:r>
-            <a:r>
-              <a:rPr lang="pt-BR" dirty="0" err="1"/>
-              <a:t>Signal</a:t>
-            </a:r>
-            <a:r>
-              <a:rPr lang="pt-BR" dirty="0"/>
-              <a:t> </a:t>
-            </a:r>
-            <a:r>
-              <a:rPr lang="pt-BR" dirty="0" err="1"/>
-              <a:t>Strength</a:t>
-            </a:r>
-            <a:r>
-              <a:rPr lang="pt-BR" dirty="0"/>
-              <a:t> </a:t>
-            </a:r>
-            <a:r>
-              <a:rPr lang="pt-BR" dirty="0" err="1"/>
-              <a:t>Indicator</a:t>
-            </a:r>
-            <a:r>
-              <a:rPr lang="pt-BR" dirty="0"/>
-              <a:t>):</a:t>
-            </a:r>
-          </a:p>
-          <a:p>
-            <a:pPr lvl="1"/>
-            <a:r>
-              <a:rPr lang="pt-BR" dirty="0"/>
-              <a:t>Indicador de força/intensidade do sinal recebido</a:t>
-            </a:r>
-          </a:p>
-          <a:p>
-            <a:pPr lvl="1"/>
-            <a:r>
-              <a:rPr lang="pt-BR" dirty="0"/>
-              <a:t>O cálculo do RSSI é feito automaticamente por uma função já existente na biblioteca do módulo ESP8266 que retorna um valor em dB;</a:t>
-            </a:r>
-          </a:p>
-          <a:p>
-            <a:pPr marL="0" indent="0">
-              <a:buNone/>
-            </a:pPr>
-            <a:endParaRPr lang="pt-BR" dirty="0"/>
-          </a:p>
-        </p:txBody>
-      </p:sp>
+          <p:cNvPicPr>
+            <a:picLocks noChangeAspect="1"/>
+          </p:cNvPicPr>
+          <p:nvPr/>
+        </p:nvPicPr>
+        <p:blipFill>
+          <a:blip r:embed="rId3"/>
+          <a:stretch>
+            <a:fillRect/>
+          </a:stretch>
+        </p:blipFill>
+        <p:spPr>
+          <a:xfrm>
+            <a:off x="8256104" y="1742909"/>
+            <a:ext cx="3364819" cy="724541"/>
+          </a:xfrm>
+          <a:prstGeom prst="rect">
+            <a:avLst/>
+          </a:prstGeom>
+        </p:spPr>
+      </p:pic>
+      <p:pic>
+        <p:nvPicPr>
+          <p:cNvPr id="7" name="Imagem 6">
+            <a:extLst>
+              <a:ext uri="{FF2B5EF4-FFF2-40B4-BE49-F238E27FC236}">
+                <a16:creationId xmlns:a16="http://schemas.microsoft.com/office/drawing/2014/main" id="{2B94C1A4-0BDC-4F0B-9319-8B4E5AE66092}"/>
+              </a:ext>
+            </a:extLst>
+          </p:cNvPr>
+          <p:cNvPicPr>
+            <a:picLocks noChangeAspect="1"/>
+          </p:cNvPicPr>
+          <p:nvPr/>
+        </p:nvPicPr>
+        <p:blipFill>
+          <a:blip r:embed="rId4"/>
+          <a:stretch>
+            <a:fillRect/>
+          </a:stretch>
+        </p:blipFill>
+        <p:spPr>
+          <a:xfrm>
+            <a:off x="8356533" y="2684180"/>
+            <a:ext cx="2766394" cy="433444"/>
+          </a:xfrm>
+          <a:prstGeom prst="rect">
+            <a:avLst/>
+          </a:prstGeom>
+        </p:spPr>
+      </p:pic>
+      <p:pic>
+        <p:nvPicPr>
+          <p:cNvPr id="8" name="Imagem 7">
+            <a:extLst>
+              <a:ext uri="{FF2B5EF4-FFF2-40B4-BE49-F238E27FC236}">
+                <a16:creationId xmlns:a16="http://schemas.microsoft.com/office/drawing/2014/main" id="{B2217DE7-186A-4A1F-BC4D-8FA0C9D33A4A}"/>
+              </a:ext>
+            </a:extLst>
+          </p:cNvPr>
+          <p:cNvPicPr>
+            <a:picLocks noChangeAspect="1"/>
+          </p:cNvPicPr>
+          <p:nvPr/>
+        </p:nvPicPr>
+        <p:blipFill>
+          <a:blip r:embed="rId5"/>
+          <a:stretch>
+            <a:fillRect/>
+          </a:stretch>
+        </p:blipFill>
+        <p:spPr>
+          <a:xfrm>
+            <a:off x="11122927" y="2733201"/>
+            <a:ext cx="645003" cy="335402"/>
+          </a:xfrm>
+          <a:prstGeom prst="rect">
+            <a:avLst/>
+          </a:prstGeom>
+        </p:spPr>
+      </p:pic>
+      <p:pic>
+        <p:nvPicPr>
+          <p:cNvPr id="5" name="Imagem 4">
+            <a:extLst>
+              <a:ext uri="{FF2B5EF4-FFF2-40B4-BE49-F238E27FC236}">
+                <a16:creationId xmlns:a16="http://schemas.microsoft.com/office/drawing/2014/main" id="{6CE9D224-2685-4638-B91D-DDEDE77FAE85}"/>
+              </a:ext>
+            </a:extLst>
+          </p:cNvPr>
+          <p:cNvPicPr>
+            <a:picLocks noChangeAspect="1"/>
+          </p:cNvPicPr>
+          <p:nvPr/>
+        </p:nvPicPr>
+        <p:blipFill>
+          <a:blip r:embed="rId6"/>
+          <a:stretch>
+            <a:fillRect/>
+          </a:stretch>
+        </p:blipFill>
+        <p:spPr>
+          <a:xfrm>
+            <a:off x="7977808" y="4079573"/>
+            <a:ext cx="4094922" cy="518092"/>
+          </a:xfrm>
+          <a:prstGeom prst="rect">
+            <a:avLst/>
+          </a:prstGeom>
+        </p:spPr>
+      </p:pic>
     </p:spTree>
     <p:extLst>
       <p:ext uri="{BB962C8B-B14F-4D97-AF65-F5344CB8AC3E}">
-        <p14:creationId xmlns:p14="http://schemas.microsoft.com/office/powerpoint/2010/main" val="3410326930"/>
+        <p14:creationId xmlns:p14="http://schemas.microsoft.com/office/powerpoint/2010/main" val="63261545"/>
       </p:ext>
     </p:extLst>
   </p:cSld>

</xml_diff>